<commit_message>
Updated the readme, worked on the ppp
</commit_message>
<xml_diff>
--- a/SparkClass4.pptx
+++ b/SparkClass4.pptx
@@ -6,7 +6,8 @@
   </p:sldMasterIdLst>
   <p:sldIdLst>
     <p:sldId id="256" r:id="rId2"/>
-    <p:sldId id="257" r:id="rId3"/>
+    <p:sldId id="258" r:id="rId3"/>
+    <p:sldId id="257" r:id="rId4"/>
   </p:sldIdLst>
   <p:sldSz cx="12192000" cy="6858000"/>
   <p:notesSz cx="6858000" cy="9144000"/>
@@ -105,6 +106,11 @@
       </a:defRPr>
     </a:lvl9pPr>
   </p:defaultTextStyle>
+  <p:extLst>
+    <p:ext uri="{EFAFB233-063F-42B5-8137-9DF3F51BA10A}">
+      <p15:sldGuideLst xmlns:p15="http://schemas.microsoft.com/office/powerpoint/2012/main"/>
+    </p:ext>
+  </p:extLst>
 </p:presentation>
 </file>
 
@@ -287,7 +293,7 @@
           <a:p>
             <a:fld id="{1F0FA21E-DB45-475D-A17D-32C421068B5C}" type="datetimeFigureOut">
               <a:rPr lang="en-US" smtClean="0"/>
-              <a:t>2023-08-05</a:t>
+              <a:t>2023-08-17</a:t>
             </a:fld>
             <a:endParaRPr lang="en-US"/>
           </a:p>
@@ -455,7 +461,7 @@
           <a:p>
             <a:fld id="{1F0FA21E-DB45-475D-A17D-32C421068B5C}" type="datetimeFigureOut">
               <a:rPr lang="en-US" smtClean="0"/>
-              <a:t>2023-08-05</a:t>
+              <a:t>2023-08-17</a:t>
             </a:fld>
             <a:endParaRPr lang="en-US"/>
           </a:p>
@@ -633,7 +639,7 @@
           <a:p>
             <a:fld id="{1F0FA21E-DB45-475D-A17D-32C421068B5C}" type="datetimeFigureOut">
               <a:rPr lang="en-US" smtClean="0"/>
-              <a:t>2023-08-05</a:t>
+              <a:t>2023-08-17</a:t>
             </a:fld>
             <a:endParaRPr lang="en-US"/>
           </a:p>
@@ -801,7 +807,7 @@
           <a:p>
             <a:fld id="{1F0FA21E-DB45-475D-A17D-32C421068B5C}" type="datetimeFigureOut">
               <a:rPr lang="en-US" smtClean="0"/>
-              <a:t>2023-08-05</a:t>
+              <a:t>2023-08-17</a:t>
             </a:fld>
             <a:endParaRPr lang="en-US"/>
           </a:p>
@@ -1046,7 +1052,7 @@
           <a:p>
             <a:fld id="{1F0FA21E-DB45-475D-A17D-32C421068B5C}" type="datetimeFigureOut">
               <a:rPr lang="en-US" smtClean="0"/>
-              <a:t>2023-08-05</a:t>
+              <a:t>2023-08-17</a:t>
             </a:fld>
             <a:endParaRPr lang="en-US"/>
           </a:p>
@@ -1331,7 +1337,7 @@
           <a:p>
             <a:fld id="{1F0FA21E-DB45-475D-A17D-32C421068B5C}" type="datetimeFigureOut">
               <a:rPr lang="en-US" smtClean="0"/>
-              <a:t>2023-08-05</a:t>
+              <a:t>2023-08-17</a:t>
             </a:fld>
             <a:endParaRPr lang="en-US"/>
           </a:p>
@@ -1750,7 +1756,7 @@
           <a:p>
             <a:fld id="{1F0FA21E-DB45-475D-A17D-32C421068B5C}" type="datetimeFigureOut">
               <a:rPr lang="en-US" smtClean="0"/>
-              <a:t>2023-08-05</a:t>
+              <a:t>2023-08-17</a:t>
             </a:fld>
             <a:endParaRPr lang="en-US"/>
           </a:p>
@@ -1867,7 +1873,7 @@
           <a:p>
             <a:fld id="{1F0FA21E-DB45-475D-A17D-32C421068B5C}" type="datetimeFigureOut">
               <a:rPr lang="en-US" smtClean="0"/>
-              <a:t>2023-08-05</a:t>
+              <a:t>2023-08-17</a:t>
             </a:fld>
             <a:endParaRPr lang="en-US"/>
           </a:p>
@@ -1962,7 +1968,7 @@
           <a:p>
             <a:fld id="{1F0FA21E-DB45-475D-A17D-32C421068B5C}" type="datetimeFigureOut">
               <a:rPr lang="en-US" smtClean="0"/>
-              <a:t>2023-08-05</a:t>
+              <a:t>2023-08-17</a:t>
             </a:fld>
             <a:endParaRPr lang="en-US"/>
           </a:p>
@@ -2237,7 +2243,7 @@
           <a:p>
             <a:fld id="{1F0FA21E-DB45-475D-A17D-32C421068B5C}" type="datetimeFigureOut">
               <a:rPr lang="en-US" smtClean="0"/>
-              <a:t>2023-08-05</a:t>
+              <a:t>2023-08-17</a:t>
             </a:fld>
             <a:endParaRPr lang="en-US"/>
           </a:p>
@@ -2492,7 +2498,7 @@
           <a:p>
             <a:fld id="{1F0FA21E-DB45-475D-A17D-32C421068B5C}" type="datetimeFigureOut">
               <a:rPr lang="en-US" smtClean="0"/>
-              <a:t>2023-08-05</a:t>
+              <a:t>2023-08-17</a:t>
             </a:fld>
             <a:endParaRPr lang="en-US"/>
           </a:p>
@@ -2703,7 +2709,7 @@
           <a:p>
             <a:fld id="{1F0FA21E-DB45-475D-A17D-32C421068B5C}" type="datetimeFigureOut">
               <a:rPr lang="en-US" smtClean="0"/>
-              <a:t>2023-08-05</a:t>
+              <a:t>2023-08-17</a:t>
             </a:fld>
             <a:endParaRPr lang="en-US"/>
           </a:p>
@@ -3175,6 +3181,117 @@
           <p:cNvPr id="2" name="Title 1">
             <a:extLst>
               <a:ext uri="{FF2B5EF4-FFF2-40B4-BE49-F238E27FC236}">
+                <a16:creationId xmlns:a16="http://schemas.microsoft.com/office/drawing/2014/main" id="{6801C8CF-8DD2-FE98-5B99-80DA4DBD9E4B}"/>
+              </a:ext>
+            </a:extLst>
+          </p:cNvPr>
+          <p:cNvSpPr>
+            <a:spLocks noGrp="1"/>
+          </p:cNvSpPr>
+          <p:nvPr>
+            <p:ph type="title"/>
+          </p:nvPr>
+        </p:nvSpPr>
+        <p:spPr/>
+        <p:txBody>
+          <a:bodyPr/>
+          <a:lstStyle/>
+          <a:p>
+            <a:r>
+              <a:rPr lang="en-US" dirty="0">
+                <a:latin typeface="times new roman" panose="02020603050405020304" pitchFamily="18" charset="0"/>
+              </a:rPr>
+              <a:t>Why do we compete?</a:t>
+            </a:r>
+            <a:endParaRPr lang="en-US" dirty="0"/>
+          </a:p>
+        </p:txBody>
+      </p:sp>
+      <p:sp>
+        <p:nvSpPr>
+          <p:cNvPr id="3" name="Content Placeholder 2">
+            <a:extLst>
+              <a:ext uri="{FF2B5EF4-FFF2-40B4-BE49-F238E27FC236}">
+                <a16:creationId xmlns:a16="http://schemas.microsoft.com/office/drawing/2014/main" id="{624382E8-2042-B814-640C-11075D1C180F}"/>
+              </a:ext>
+            </a:extLst>
+          </p:cNvPr>
+          <p:cNvSpPr>
+            <a:spLocks noGrp="1"/>
+          </p:cNvSpPr>
+          <p:nvPr>
+            <p:ph idx="1"/>
+          </p:nvPr>
+        </p:nvSpPr>
+        <p:spPr/>
+        <p:txBody>
+          <a:bodyPr/>
+          <a:lstStyle/>
+          <a:p>
+            <a:r>
+              <a:rPr lang="en-US" dirty="0">
+                <a:effectLst/>
+                <a:latin typeface="times new roman" panose="02020603050405020304" pitchFamily="18" charset="0"/>
+              </a:rPr>
+              <a:t>What alternative social-economic models exist? </a:t>
+            </a:r>
+          </a:p>
+          <a:p>
+            <a:r>
+              <a:rPr lang="en-US" dirty="0">
+                <a:effectLst/>
+                <a:latin typeface="times new roman" panose="02020603050405020304" pitchFamily="18" charset="0"/>
+              </a:rPr>
+              <a:t>When, if ever, does competition make logical sense?  </a:t>
+            </a:r>
+          </a:p>
+          <a:p>
+            <a:r>
+              <a:rPr lang="en-US" dirty="0">
+                <a:effectLst/>
+                <a:latin typeface="times new roman" panose="02020603050405020304" pitchFamily="18" charset="0"/>
+              </a:rPr>
+              <a:t>What are the differences between productive collaboration and illegal “anticompetitive” business collusion?  </a:t>
+            </a:r>
+            <a:endParaRPr lang="en-US" dirty="0"/>
+          </a:p>
+        </p:txBody>
+      </p:sp>
+    </p:spTree>
+    <p:extLst>
+      <p:ext uri="{BB962C8B-B14F-4D97-AF65-F5344CB8AC3E}">
+        <p14:creationId xmlns:p14="http://schemas.microsoft.com/office/powerpoint/2010/main" val="2057337627"/>
+      </p:ext>
+    </p:extLst>
+  </p:cSld>
+  <p:clrMapOvr>
+    <a:masterClrMapping/>
+  </p:clrMapOvr>
+</p:sld>
+</file>
+
+<file path=ppt/slides/slide3.xml><?xml version="1.0" encoding="utf-8"?>
+<p:sld xmlns:a="http://schemas.openxmlformats.org/drawingml/2006/main" xmlns:r="http://schemas.openxmlformats.org/officeDocument/2006/relationships" xmlns:p="http://schemas.openxmlformats.org/presentationml/2006/main">
+  <p:cSld>
+    <p:spTree>
+      <p:nvGrpSpPr>
+        <p:cNvPr id="1" name=""/>
+        <p:cNvGrpSpPr/>
+        <p:nvPr/>
+      </p:nvGrpSpPr>
+      <p:grpSpPr>
+        <a:xfrm>
+          <a:off x="0" y="0"/>
+          <a:ext cx="0" cy="0"/>
+          <a:chOff x="0" y="0"/>
+          <a:chExt cx="0" cy="0"/>
+        </a:xfrm>
+      </p:grpSpPr>
+      <p:sp>
+        <p:nvSpPr>
+          <p:cNvPr id="2" name="Title 1">
+            <a:extLst>
+              <a:ext uri="{FF2B5EF4-FFF2-40B4-BE49-F238E27FC236}">
                 <a16:creationId xmlns:a16="http://schemas.microsoft.com/office/drawing/2014/main" id="{2411D8C9-C6CA-9A62-DD8F-DB5A2ECFF3D7}"/>
               </a:ext>
             </a:extLst>

</xml_diff>